<commit_message>
draft report and final deliverables
- updated ppt
- draft report
- code cleanup
</commit_message>
<xml_diff>
--- a/docs/capstone.pptx
+++ b/docs/capstone.pptx
@@ -1791,7 +1791,7 @@
 <dgm:dataModel xmlns:dgm="http://schemas.openxmlformats.org/drawingml/2006/diagram" xmlns:a="http://schemas.openxmlformats.org/drawingml/2006/main">
   <dgm:ptLst>
     <dgm:pt modelId="{092C21CE-FEBD-447F-BC53-9D41BC2EBF3A}" type="doc">
-      <dgm:prSet loTypeId="urn:microsoft.com/office/officeart/2008/layout/LinedList" loCatId="list" qsTypeId="urn:microsoft.com/office/officeart/2005/8/quickstyle/simple5" qsCatId="simple" csTypeId="urn:microsoft.com/office/officeart/2005/8/colors/accent6_2" csCatId="accent6"/>
+      <dgm:prSet loTypeId="urn:microsoft.com/office/officeart/2008/layout/LinedList" loCatId="list" qsTypeId="urn:microsoft.com/office/officeart/2005/8/quickstyle/simple5" qsCatId="simple" csTypeId="urn:microsoft.com/office/officeart/2005/8/colors/accent6_2" csCatId="accent6" phldr="1"/>
       <dgm:spPr/>
       <dgm:t>
         <a:bodyPr/>
@@ -1846,10 +1846,18 @@
         <a:lstStyle/>
         <a:p>
           <a:r>
-            <a:rPr lang="en-US" b="0" i="0"/>
-            <a:t>Dataset: DonateaCry Corpus - comprehensive infant cry sounds dataset with varying health conditions.</a:t>
+            <a:rPr lang="en-US" b="0" i="0" dirty="0"/>
+            <a:t>Dataset: </a:t>
           </a:r>
-          <a:endParaRPr lang="en-US"/>
+          <a:r>
+            <a:rPr lang="en-US" b="0" i="0" dirty="0" err="1"/>
+            <a:t>DonateaCry</a:t>
+          </a:r>
+          <a:r>
+            <a:rPr lang="en-US" b="0" i="0" dirty="0"/>
+            <a:t> Corpus - comprehensive infant cry sounds dataset with varying health conditions. – 457 records</a:t>
+          </a:r>
+          <a:endParaRPr lang="en-US" dirty="0"/>
         </a:p>
       </dgm:t>
     </dgm:pt>
@@ -1883,10 +1891,10 @@
         <a:lstStyle/>
         <a:p>
           <a:r>
-            <a:rPr lang="en-US" b="0" i="0"/>
-            <a:t>Methodology: Audio processing, feature extraction, and machine learning algorithms for data analysis.</a:t>
+            <a:rPr lang="en-US" b="0" i="0" dirty="0"/>
+            <a:t>Methodology: Audio processing, feature extraction, and modelling with convolutional neural networks.</a:t>
           </a:r>
-          <a:endParaRPr lang="en-US"/>
+          <a:endParaRPr lang="en-US" dirty="0"/>
         </a:p>
       </dgm:t>
     </dgm:pt>
@@ -2843,10 +2851,18 @@
             <a:buNone/>
           </a:pPr>
           <a:r>
-            <a:rPr lang="en-US" sz="1600" b="0" i="0" kern="1200"/>
-            <a:t>Dataset: DonateaCry Corpus - comprehensive infant cry sounds dataset with varying health conditions.</a:t>
+            <a:rPr lang="en-US" sz="1600" b="0" i="0" kern="1200" dirty="0"/>
+            <a:t>Dataset: </a:t>
           </a:r>
-          <a:endParaRPr lang="en-US" sz="1600" kern="1200"/>
+          <a:r>
+            <a:rPr lang="en-US" sz="1600" b="0" i="0" kern="1200" dirty="0" err="1"/>
+            <a:t>DonateaCry</a:t>
+          </a:r>
+          <a:r>
+            <a:rPr lang="en-US" sz="1600" b="0" i="0" kern="1200" dirty="0"/>
+            <a:t> Corpus - comprehensive infant cry sounds dataset with varying health conditions. – 457 records</a:t>
+          </a:r>
+          <a:endParaRPr lang="en-US" sz="1600" kern="1200" dirty="0"/>
         </a:p>
       </dsp:txBody>
       <dsp:txXfrm>
@@ -2990,10 +3006,10 @@
             <a:buNone/>
           </a:pPr>
           <a:r>
-            <a:rPr lang="en-US" sz="1600" b="0" i="0" kern="1200"/>
-            <a:t>Methodology: Audio processing, feature extraction, and machine learning algorithms for data analysis.</a:t>
+            <a:rPr lang="en-US" sz="1600" b="0" i="0" kern="1200" dirty="0"/>
+            <a:t>Methodology: Audio processing, feature extraction, and modelling with convolutional neural networks.</a:t>
           </a:r>
-          <a:endParaRPr lang="en-US" sz="1600" kern="1200"/>
+          <a:endParaRPr lang="en-US" sz="1600" kern="1200" dirty="0"/>
         </a:p>
       </dsp:txBody>
       <dsp:txXfrm>
@@ -11330,7 +11346,7 @@
             <p:ph idx="1"/>
             <p:extLst>
               <p:ext uri="{D42A27DB-BD31-4B8C-83A1-F6EECF244321}">
-                <p14:modId xmlns:p14="http://schemas.microsoft.com/office/powerpoint/2010/main" val="1241918266"/>
+                <p14:modId xmlns:p14="http://schemas.microsoft.com/office/powerpoint/2010/main" val="1561885842"/>
               </p:ext>
             </p:extLst>
           </p:nvPr>

</xml_diff>